<commit_message>
commits as of Jun 26
</commit_message>
<xml_diff>
--- a/final-project/3/DS-SF-34_Final_Project_Part3_Carol_Fan_26Jun2017.pptx
+++ b/final-project/3/DS-SF-34_Final_Project_Part3_Carol_Fan_26Jun2017.pptx
@@ -202,7 +202,7 @@
           <a:p>
             <a:fld id="{42A285B5-CC51-8B4F-B815-9110C4096610}" type="datetimeFigureOut">
               <a:rPr lang="en-US" smtClean="0"/>
-              <a:t>6/23/17</a:t>
+              <a:t>6/26/17</a:t>
             </a:fld>
             <a:endParaRPr lang="en-US"/>
           </a:p>
@@ -999,7 +999,7 @@
           <a:p>
             <a:fld id="{7AD9A508-50E3-F64A-9026-12F97E9ADF01}" type="datetimeFigureOut">
               <a:rPr lang="en-US" smtClean="0"/>
-              <a:t>6/23/17</a:t>
+              <a:t>6/26/17</a:t>
             </a:fld>
             <a:endParaRPr lang="en-US"/>
           </a:p>
@@ -1169,7 +1169,7 @@
           <a:p>
             <a:fld id="{7AD9A508-50E3-F64A-9026-12F97E9ADF01}" type="datetimeFigureOut">
               <a:rPr lang="en-US" smtClean="0"/>
-              <a:t>6/23/17</a:t>
+              <a:t>6/26/17</a:t>
             </a:fld>
             <a:endParaRPr lang="en-US"/>
           </a:p>
@@ -1349,7 +1349,7 @@
           <a:p>
             <a:fld id="{7AD9A508-50E3-F64A-9026-12F97E9ADF01}" type="datetimeFigureOut">
               <a:rPr lang="en-US" smtClean="0"/>
-              <a:t>6/23/17</a:t>
+              <a:t>6/26/17</a:t>
             </a:fld>
             <a:endParaRPr lang="en-US"/>
           </a:p>
@@ -1519,7 +1519,7 @@
           <a:p>
             <a:fld id="{7AD9A508-50E3-F64A-9026-12F97E9ADF01}" type="datetimeFigureOut">
               <a:rPr lang="en-US" smtClean="0"/>
-              <a:t>6/23/17</a:t>
+              <a:t>6/26/17</a:t>
             </a:fld>
             <a:endParaRPr lang="en-US"/>
           </a:p>
@@ -1765,7 +1765,7 @@
           <a:p>
             <a:fld id="{7AD9A508-50E3-F64A-9026-12F97E9ADF01}" type="datetimeFigureOut">
               <a:rPr lang="en-US" smtClean="0"/>
-              <a:t>6/23/17</a:t>
+              <a:t>6/26/17</a:t>
             </a:fld>
             <a:endParaRPr lang="en-US"/>
           </a:p>
@@ -2053,7 +2053,7 @@
           <a:p>
             <a:fld id="{7AD9A508-50E3-F64A-9026-12F97E9ADF01}" type="datetimeFigureOut">
               <a:rPr lang="en-US" smtClean="0"/>
-              <a:t>6/23/17</a:t>
+              <a:t>6/26/17</a:t>
             </a:fld>
             <a:endParaRPr lang="en-US"/>
           </a:p>
@@ -2475,7 +2475,7 @@
           <a:p>
             <a:fld id="{7AD9A508-50E3-F64A-9026-12F97E9ADF01}" type="datetimeFigureOut">
               <a:rPr lang="en-US" smtClean="0"/>
-              <a:t>6/23/17</a:t>
+              <a:t>6/26/17</a:t>
             </a:fld>
             <a:endParaRPr lang="en-US"/>
           </a:p>
@@ -2593,7 +2593,7 @@
           <a:p>
             <a:fld id="{7AD9A508-50E3-F64A-9026-12F97E9ADF01}" type="datetimeFigureOut">
               <a:rPr lang="en-US" smtClean="0"/>
-              <a:t>6/23/17</a:t>
+              <a:t>6/26/17</a:t>
             </a:fld>
             <a:endParaRPr lang="en-US"/>
           </a:p>
@@ -2688,7 +2688,7 @@
           <a:p>
             <a:fld id="{7AD9A508-50E3-F64A-9026-12F97E9ADF01}" type="datetimeFigureOut">
               <a:rPr lang="en-US" smtClean="0"/>
-              <a:t>6/23/17</a:t>
+              <a:t>6/26/17</a:t>
             </a:fld>
             <a:endParaRPr lang="en-US"/>
           </a:p>
@@ -2965,7 +2965,7 @@
           <a:p>
             <a:fld id="{7AD9A508-50E3-F64A-9026-12F97E9ADF01}" type="datetimeFigureOut">
               <a:rPr lang="en-US" smtClean="0"/>
-              <a:t>6/23/17</a:t>
+              <a:t>6/26/17</a:t>
             </a:fld>
             <a:endParaRPr lang="en-US"/>
           </a:p>
@@ -3218,7 +3218,7 @@
           <a:p>
             <a:fld id="{7AD9A508-50E3-F64A-9026-12F97E9ADF01}" type="datetimeFigureOut">
               <a:rPr lang="en-US" smtClean="0"/>
-              <a:t>6/23/17</a:t>
+              <a:t>6/26/17</a:t>
             </a:fld>
             <a:endParaRPr lang="en-US"/>
           </a:p>
@@ -3431,7 +3431,7 @@
           <a:p>
             <a:fld id="{7AD9A508-50E3-F64A-9026-12F97E9ADF01}" type="datetimeFigureOut">
               <a:rPr lang="en-US" smtClean="0"/>
-              <a:t>6/23/17</a:t>
+              <a:t>6/26/17</a:t>
             </a:fld>
             <a:endParaRPr lang="en-US"/>
           </a:p>
@@ -3981,38 +3981,13 @@
           <a:p>
             <a:r>
               <a:rPr lang="en-US" sz="3000" dirty="0" smtClean="0"/>
-              <a:t>Logistic Regression Grid Search CV Score:   </a:t>
-            </a:r>
+              <a:t>Logistic Regression Grid Search CV Score:   94.3%</a:t>
+            </a:r>
+          </a:p>
+          <a:p>
             <a:r>
               <a:rPr lang="en-US" sz="3000" dirty="0" smtClean="0"/>
-              <a:t>94.3%</a:t>
-            </a:r>
-            <a:endParaRPr lang="en-US" sz="3000" dirty="0" smtClean="0"/>
-          </a:p>
-          <a:p>
-            <a:r>
-              <a:rPr lang="en-US" sz="3000" dirty="0" smtClean="0"/>
-              <a:t>Random Forest Grid Search OOB Score:  </a:t>
-            </a:r>
-            <a:r>
-              <a:rPr lang="en-US" sz="3000" dirty="0" smtClean="0"/>
-              <a:t>87.1</a:t>
-            </a:r>
-            <a:r>
-              <a:rPr lang="en-US" sz="3000" dirty="0" smtClean="0"/>
-              <a:t>%        </a:t>
-            </a:r>
-            <a:r>
-              <a:rPr lang="en-US" sz="3000" dirty="0" smtClean="0"/>
-              <a:t>(CV </a:t>
-            </a:r>
-            <a:r>
-              <a:rPr lang="en-US" sz="3000" dirty="0" smtClean="0"/>
-              <a:t>82.9%</a:t>
-            </a:r>
-            <a:r>
-              <a:rPr lang="en-US" sz="3000" dirty="0" smtClean="0"/>
-              <a:t>)</a:t>
+              <a:t>Random Forest Grid Search OOB Score:  87.1%        (CV 82.9%)</a:t>
             </a:r>
           </a:p>
           <a:p>
@@ -4027,11 +4002,7 @@
             </a:r>
             <a:r>
               <a:rPr lang="en-US" sz="2600" dirty="0" smtClean="0"/>
-              <a:t> First </a:t>
-            </a:r>
-            <a:r>
-              <a:rPr lang="en-US" sz="2600" dirty="0" smtClean="0"/>
-              <a:t>Y</a:t>
+              <a:t> First Y</a:t>
             </a:r>
             <a:endParaRPr lang="en-US" sz="2600" dirty="0"/>
           </a:p>
@@ -4070,11 +4041,7 @@
             </a:r>
             <a:r>
               <a:rPr lang="en-US" sz="2600" dirty="0" smtClean="0"/>
-              <a:t>Ring </a:t>
-            </a:r>
-            <a:r>
-              <a:rPr lang="en-US" sz="2600" dirty="0" smtClean="0"/>
-              <a:t>Bend</a:t>
+              <a:t>Ring Bend</a:t>
             </a:r>
             <a:endParaRPr lang="en-US" sz="2600" dirty="0"/>
           </a:p>
@@ -4213,7 +4180,7 @@
         <p:spPr/>
         <p:txBody>
           <a:bodyPr>
-            <a:normAutofit fontScale="92500" lnSpcReduction="20000"/>
+            <a:normAutofit fontScale="92500" lnSpcReduction="10000"/>
           </a:bodyPr>
           <a:lstStyle/>
           <a:p>
@@ -4248,15 +4215,7 @@
           <a:p>
             <a:r>
               <a:rPr lang="en-US" dirty="0" smtClean="0"/>
-              <a:t>Not terrible (&gt; </a:t>
-            </a:r>
-            <a:r>
-              <a:rPr lang="en-US" dirty="0" smtClean="0"/>
-              <a:t>90</a:t>
-            </a:r>
-            <a:r>
-              <a:rPr lang="en-US" dirty="0" smtClean="0"/>
-              <a:t>% accuracy) to distinguish between What and 5 other words</a:t>
+              <a:t>Not terrible (&gt; 90% accuracy) to distinguish between What and 5 other words</a:t>
             </a:r>
           </a:p>
           <a:p>
@@ -4267,15 +4226,7 @@
             </a:r>
             <a:r>
               <a:rPr lang="en-US" dirty="0" smtClean="0"/>
-              <a:t>o </a:t>
-            </a:r>
-            <a:r>
-              <a:rPr lang="en-US" dirty="0" smtClean="0"/>
-              <a:t>agreement on important </a:t>
-            </a:r>
-            <a:r>
-              <a:rPr lang="en-US" dirty="0" smtClean="0"/>
-              <a:t>features</a:t>
+              <a:t>o agreement on important features</a:t>
             </a:r>
             <a:r>
               <a:rPr lang="en-US" dirty="0"/>
@@ -4283,26 +4234,7 @@
             </a:r>
             <a:r>
               <a:rPr lang="en-US" dirty="0" smtClean="0"/>
-              <a:t>(</a:t>
-            </a:r>
-            <a:r>
-              <a:rPr lang="en-US" dirty="0" smtClean="0"/>
-              <a:t>due </a:t>
-            </a:r>
-            <a:r>
-              <a:rPr lang="en-US" dirty="0" smtClean="0"/>
-              <a:t>to sample </a:t>
-            </a:r>
-            <a:r>
-              <a:rPr lang="en-US" dirty="0" smtClean="0"/>
-              <a:t>selected?)</a:t>
-            </a:r>
-            <a:endParaRPr lang="en-US" dirty="0" smtClean="0"/>
-          </a:p>
-          <a:p>
-            <a:r>
-              <a:rPr lang="en-US" dirty="0" smtClean="0"/>
-              <a:t>Limited feature set did not improve performance</a:t>
+              <a:t>(due to sample selected?)</a:t>
             </a:r>
           </a:p>
           <a:p>
@@ -4863,7 +4795,6 @@
               <a:rPr lang="en-US" dirty="0" smtClean="0"/>
               <a:t>Differences between </a:t>
             </a:r>
-            <a:endParaRPr lang="en-US" dirty="0" smtClean="0"/>
           </a:p>
           <a:p>
             <a:pPr marL="457200" lvl="1" indent="0">
@@ -4871,11 +4802,7 @@
             </a:pPr>
             <a:r>
               <a:rPr lang="en-US" dirty="0" smtClean="0"/>
-              <a:t>first</a:t>
-            </a:r>
-            <a:r>
-              <a:rPr lang="en-US" dirty="0" smtClean="0"/>
-              <a:t>, middle, and last values</a:t>
+              <a:t>first, middle, and last values</a:t>
             </a:r>
           </a:p>
           <a:p>
@@ -4892,7 +4819,6 @@
               <a:rPr lang="en-US" dirty="0" smtClean="0"/>
               <a:t> percentile value </a:t>
             </a:r>
-            <a:endParaRPr lang="en-US" dirty="0" smtClean="0"/>
           </a:p>
           <a:p>
             <a:pPr marL="457200" lvl="1" indent="0">
@@ -4912,11 +4838,7 @@
             </a:r>
             <a:r>
               <a:rPr lang="en-US" dirty="0" smtClean="0"/>
-              <a:t> </a:t>
-            </a:r>
-            <a:r>
-              <a:rPr lang="en-US" dirty="0" smtClean="0"/>
-              <a:t>25</a:t>
+              <a:t> 25</a:t>
             </a:r>
             <a:r>
               <a:rPr lang="en-US" baseline="30000" dirty="0" smtClean="0"/>
@@ -6152,13 +6074,8 @@
           <a:p>
             <a:r>
               <a:rPr lang="en-US" dirty="0" smtClean="0"/>
-              <a:t>Logistic Regression Grid Search CV Score:   </a:t>
-            </a:r>
-            <a:r>
-              <a:rPr lang="en-US" dirty="0" smtClean="0"/>
-              <a:t>94.6%</a:t>
-            </a:r>
-            <a:endParaRPr lang="en-US" dirty="0" smtClean="0"/>
+              <a:t>Logistic Regression Grid Search CV Score:   94.6%</a:t>
+            </a:r>
           </a:p>
           <a:p>
             <a:r>
@@ -6171,23 +6088,7 @@
             </a:r>
             <a:r>
               <a:rPr lang="en-US" dirty="0" smtClean="0"/>
-              <a:t>Score:  </a:t>
-            </a:r>
-            <a:r>
-              <a:rPr lang="en-US" dirty="0" smtClean="0"/>
-              <a:t>93.2% </a:t>
-            </a:r>
-            <a:r>
-              <a:rPr lang="en-US" dirty="0" smtClean="0"/>
-              <a:t>(CV </a:t>
-            </a:r>
-            <a:r>
-              <a:rPr lang="en-US" dirty="0" smtClean="0"/>
-              <a:t>88.0%</a:t>
-            </a:r>
-            <a:r>
-              <a:rPr lang="en-US" dirty="0" smtClean="0"/>
-              <a:t>)</a:t>
+              <a:t>Score:  93.2% (CV 88.0%)</a:t>
             </a:r>
           </a:p>
           <a:p>
@@ -6236,7 +6137,6 @@
               <a:rPr lang="en-US" dirty="0" smtClean="0"/>
               <a:t> Z</a:t>
             </a:r>
-            <a:endParaRPr lang="en-US" dirty="0" smtClean="0"/>
           </a:p>
           <a:p>
             <a:pPr lvl="1"/>
@@ -6347,11 +6247,7 @@
             </a:r>
             <a:r>
               <a:rPr lang="en-US" sz="2800" dirty="0" smtClean="0"/>
-              <a:t>      Middle </a:t>
-            </a:r>
-            <a:r>
-              <a:rPr lang="en-US" sz="2800" dirty="0" smtClean="0"/>
-              <a:t>Bend</a:t>
+              <a:t>      Middle Bend</a:t>
             </a:r>
           </a:p>
         </p:txBody>
@@ -6490,23 +6386,7 @@
             </a:r>
             <a:r>
               <a:rPr lang="en-US" dirty="0" smtClean="0"/>
-              <a:t>Score:  </a:t>
-            </a:r>
-            <a:r>
-              <a:rPr lang="en-US" dirty="0" smtClean="0"/>
-              <a:t>95.6% </a:t>
-            </a:r>
-            <a:r>
-              <a:rPr lang="en-US" dirty="0" smtClean="0"/>
-              <a:t>(CV </a:t>
-            </a:r>
-            <a:r>
-              <a:rPr lang="en-US" dirty="0" smtClean="0"/>
-              <a:t>95.6%</a:t>
-            </a:r>
-            <a:r>
-              <a:rPr lang="en-US" dirty="0" smtClean="0"/>
-              <a:t>)</a:t>
+              <a:t>Score:  95.6% (CV 95.6%)</a:t>
             </a:r>
           </a:p>
           <a:p>
@@ -6577,15 +6457,7 @@
             </a:r>
             <a:r>
               <a:rPr lang="en-US" dirty="0" smtClean="0"/>
-              <a:t> </a:t>
-            </a:r>
-            <a:r>
-              <a:rPr lang="en-US" dirty="0" smtClean="0"/>
-              <a:t>Middle</a:t>
-            </a:r>
-            <a:r>
-              <a:rPr lang="en-US" dirty="0" smtClean="0"/>
-              <a:t> </a:t>
+              <a:t> Middle </a:t>
             </a:r>
             <a:r>
               <a:rPr lang="en-US" dirty="0"/>
@@ -6643,7 +6515,6 @@
               <a:rPr lang="en-US" dirty="0" smtClean="0"/>
               <a:t> </a:t>
             </a:r>
-            <a:endParaRPr lang="en-US" dirty="0" smtClean="0"/>
           </a:p>
           <a:p>
             <a:pPr marL="457200" lvl="1" indent="0">
@@ -6655,11 +6526,7 @@
             </a:r>
             <a:r>
               <a:rPr lang="en-US" dirty="0" smtClean="0"/>
-              <a:t>      </a:t>
-            </a:r>
-            <a:r>
-              <a:rPr lang="en-US" dirty="0" smtClean="0"/>
-              <a:t>Roll</a:t>
+              <a:t>      Roll</a:t>
             </a:r>
             <a:endParaRPr lang="en-US" dirty="0"/>
           </a:p>
@@ -6784,23 +6651,7 @@
           <a:p>
             <a:r>
               <a:rPr lang="en-US" dirty="0" smtClean="0"/>
-              <a:t>Random Forest Grid Search OOB Score:  </a:t>
-            </a:r>
-            <a:r>
-              <a:rPr lang="en-US" dirty="0" smtClean="0"/>
-              <a:t>97.1% </a:t>
-            </a:r>
-            <a:r>
-              <a:rPr lang="en-US" dirty="0" smtClean="0"/>
-              <a:t>(CV </a:t>
-            </a:r>
-            <a:r>
-              <a:rPr lang="en-US" dirty="0" smtClean="0"/>
-              <a:t>97.1</a:t>
-            </a:r>
-            <a:r>
-              <a:rPr lang="en-US" dirty="0" smtClean="0"/>
-              <a:t>%)</a:t>
+              <a:t>Random Forest Grid Search OOB Score:  97.1% (CV 97.1%)</a:t>
             </a:r>
           </a:p>
           <a:p>
@@ -6837,7 +6688,6 @@
               <a:rPr lang="en-US" dirty="0" smtClean="0"/>
               <a:t> First Y</a:t>
             </a:r>
-            <a:endParaRPr lang="en-US" dirty="0" smtClean="0"/>
           </a:p>
           <a:p>
             <a:pPr lvl="1"/>
@@ -6851,11 +6701,7 @@
             </a:r>
             <a:r>
               <a:rPr lang="en-US" dirty="0" smtClean="0"/>
-              <a:t> </a:t>
-            </a:r>
-            <a:r>
-              <a:rPr lang="en-US" dirty="0" smtClean="0"/>
-              <a:t>Middle Middle</a:t>
+              <a:t> Middle Middle</a:t>
             </a:r>
           </a:p>
           <a:p>
@@ -6866,7 +6712,6 @@
               <a:rPr lang="en-US" dirty="0" smtClean="0"/>
               <a:t>       Bend</a:t>
             </a:r>
-            <a:endParaRPr lang="en-US" dirty="0" smtClean="0"/>
           </a:p>
         </p:txBody>
       </p:sp>
@@ -7046,38 +6891,13 @@
           <a:p>
             <a:r>
               <a:rPr lang="en-US" sz="3000" dirty="0" smtClean="0"/>
-              <a:t>Logistic Regression Grid Search CV Score:   </a:t>
-            </a:r>
+              <a:t>Logistic Regression Grid Search CV Score:   90.2%</a:t>
+            </a:r>
+          </a:p>
+          <a:p>
             <a:r>
               <a:rPr lang="en-US" sz="3000" dirty="0" smtClean="0"/>
-              <a:t>90.2</a:t>
-            </a:r>
-            <a:r>
-              <a:rPr lang="en-US" sz="3000" dirty="0" smtClean="0"/>
-              <a:t>%</a:t>
-            </a:r>
-            <a:endParaRPr lang="en-US" sz="3000" dirty="0" smtClean="0"/>
-          </a:p>
-          <a:p>
-            <a:r>
-              <a:rPr lang="en-US" sz="3000" dirty="0" smtClean="0"/>
-              <a:t>Random Forest Grid Search OOB Score:  </a:t>
-            </a:r>
-            <a:r>
-              <a:rPr lang="en-US" sz="3000" dirty="0" smtClean="0"/>
-              <a:t>98.8% </a:t>
-            </a:r>
-            <a:r>
-              <a:rPr lang="en-US" sz="3000" dirty="0" smtClean="0"/>
-              <a:t>(CV </a:t>
-            </a:r>
-            <a:r>
-              <a:rPr lang="en-US" sz="3000" dirty="0" smtClean="0"/>
-              <a:t>74.3%</a:t>
-            </a:r>
-            <a:r>
-              <a:rPr lang="en-US" sz="3000" dirty="0" smtClean="0"/>
-              <a:t>)</a:t>
+              <a:t>Random Forest Grid Search OOB Score:  98.8% (CV 74.3%)</a:t>
             </a:r>
           </a:p>
           <a:p>
@@ -7092,13 +6912,8 @@
             </a:r>
             <a:r>
               <a:rPr lang="en-US" sz="2600" dirty="0" smtClean="0"/>
-              <a:t> Middle </a:t>
-            </a:r>
-            <a:r>
-              <a:rPr lang="en-US" sz="2600" dirty="0" smtClean="0"/>
-              <a:t>Middle Bend</a:t>
-            </a:r>
-            <a:endParaRPr lang="en-US" sz="2600" dirty="0" smtClean="0"/>
+              <a:t> Middle Middle Bend</a:t>
+            </a:r>
           </a:p>
           <a:p>
             <a:pPr lvl="1"/>
@@ -7114,7 +6929,6 @@
               <a:rPr lang="en-US" sz="2600" dirty="0" smtClean="0"/>
               <a:t> First Roll</a:t>
             </a:r>
-            <a:endParaRPr lang="en-US" sz="2600" dirty="0" smtClean="0"/>
           </a:p>
           <a:p>
             <a:pPr lvl="1"/>

</xml_diff>